<commit_message>
mejorar documento con comentarios de Luis Javier
</commit_message>
<xml_diff>
--- a/documento/figuras/auxiliares/cr_biclase_heatmap_horizontal.pptx
+++ b/documento/figuras/auxiliares/cr_biclase_heatmap_horizontal.pptx
@@ -2,12 +2,12 @@
 <file path=ppt/presentation.xml><?xml version="1.0" encoding="utf-8"?>
 <p:presentation xmlns:a="http://schemas.openxmlformats.org/drawingml/2006/main" xmlns:r="http://schemas.openxmlformats.org/officeDocument/2006/relationships" xmlns:p="http://schemas.openxmlformats.org/presentationml/2006/main" saveSubsetFonts="1" autoCompressPictures="0">
   <p:sldMasterIdLst>
-    <p:sldMasterId id="2147483708" r:id="rId1"/>
+    <p:sldMasterId id="2147483720" r:id="rId1"/>
   </p:sldMasterIdLst>
   <p:sldIdLst>
     <p:sldId id="256" r:id="rId2"/>
   </p:sldIdLst>
-  <p:sldSz cx="10260013" cy="3419475"/>
+  <p:sldSz cx="6840538" cy="6840538"/>
   <p:notesSz cx="6858000" cy="9144000"/>
   <p:defaultTextStyle>
     <a:defPPr>
@@ -141,15 +141,15 @@
         </p:nvSpPr>
         <p:spPr>
           <a:xfrm>
-            <a:off x="1282502" y="559623"/>
-            <a:ext cx="7695010" cy="1190484"/>
+            <a:off x="513041" y="1119505"/>
+            <a:ext cx="5814457" cy="2381521"/>
           </a:xfrm>
         </p:spPr>
         <p:txBody>
           <a:bodyPr anchor="b"/>
           <a:lstStyle>
             <a:lvl1pPr algn="ctr">
-              <a:defRPr sz="2992"/>
+              <a:defRPr sz="4489"/>
             </a:lvl1pPr>
           </a:lstStyle>
           <a:p>
@@ -173,8 +173,8 @@
         </p:nvSpPr>
         <p:spPr>
           <a:xfrm>
-            <a:off x="1282502" y="1796016"/>
-            <a:ext cx="7695010" cy="825581"/>
+            <a:off x="855067" y="3592866"/>
+            <a:ext cx="5130404" cy="1651546"/>
           </a:xfrm>
         </p:spPr>
         <p:txBody>
@@ -182,39 +182,39 @@
           <a:lstStyle>
             <a:lvl1pPr marL="0" indent="0" algn="ctr">
               <a:buNone/>
+              <a:defRPr sz="1795"/>
+            </a:lvl1pPr>
+            <a:lvl2pPr marL="342031" indent="0" algn="ctr">
+              <a:buNone/>
+              <a:defRPr sz="1496"/>
+            </a:lvl2pPr>
+            <a:lvl3pPr marL="684063" indent="0" algn="ctr">
+              <a:buNone/>
+              <a:defRPr sz="1347"/>
+            </a:lvl3pPr>
+            <a:lvl4pPr marL="1026094" indent="0" algn="ctr">
+              <a:buNone/>
               <a:defRPr sz="1197"/>
-            </a:lvl1pPr>
-            <a:lvl2pPr marL="227960" indent="0" algn="ctr">
-              <a:buNone/>
-              <a:defRPr sz="997"/>
-            </a:lvl2pPr>
-            <a:lvl3pPr marL="455920" indent="0" algn="ctr">
-              <a:buNone/>
-              <a:defRPr sz="897"/>
-            </a:lvl3pPr>
-            <a:lvl4pPr marL="683880" indent="0" algn="ctr">
-              <a:buNone/>
-              <a:defRPr sz="798"/>
             </a:lvl4pPr>
-            <a:lvl5pPr marL="911840" indent="0" algn="ctr">
-              <a:buNone/>
-              <a:defRPr sz="798"/>
+            <a:lvl5pPr marL="1368125" indent="0" algn="ctr">
+              <a:buNone/>
+              <a:defRPr sz="1197"/>
             </a:lvl5pPr>
-            <a:lvl6pPr marL="1139800" indent="0" algn="ctr">
-              <a:buNone/>
-              <a:defRPr sz="798"/>
+            <a:lvl6pPr marL="1710157" indent="0" algn="ctr">
+              <a:buNone/>
+              <a:defRPr sz="1197"/>
             </a:lvl6pPr>
-            <a:lvl7pPr marL="1367760" indent="0" algn="ctr">
-              <a:buNone/>
-              <a:defRPr sz="798"/>
+            <a:lvl7pPr marL="2052188" indent="0" algn="ctr">
+              <a:buNone/>
+              <a:defRPr sz="1197"/>
             </a:lvl7pPr>
-            <a:lvl8pPr marL="1595719" indent="0" algn="ctr">
-              <a:buNone/>
-              <a:defRPr sz="798"/>
+            <a:lvl8pPr marL="2394219" indent="0" algn="ctr">
+              <a:buNone/>
+              <a:defRPr sz="1197"/>
             </a:lvl8pPr>
-            <a:lvl9pPr marL="1823679" indent="0" algn="ctr">
-              <a:buNone/>
-              <a:defRPr sz="798"/>
+            <a:lvl9pPr marL="2736251" indent="0" algn="ctr">
+              <a:buNone/>
+              <a:defRPr sz="1197"/>
             </a:lvl9pPr>
           </a:lstStyle>
           <a:p>
@@ -243,7 +243,7 @@
           <a:p>
             <a:fld id="{9D1F0D2E-BCBB-7B4B-B3C4-B871C8CF8724}" type="datetimeFigureOut">
               <a:rPr lang="es-ES" smtClean="0"/>
-              <a:t>26/7/20</a:t>
+              <a:t>1/8/20</a:t>
             </a:fld>
             <a:endParaRPr lang="es-ES"/>
           </a:p>
@@ -294,7 +294,7 @@
     </p:spTree>
     <p:extLst>
       <p:ext uri="{BB962C8B-B14F-4D97-AF65-F5344CB8AC3E}">
-        <p14:creationId xmlns:p14="http://schemas.microsoft.com/office/powerpoint/2010/main" val="2850243927"/>
+        <p14:creationId xmlns:p14="http://schemas.microsoft.com/office/powerpoint/2010/main" val="2670796140"/>
       </p:ext>
     </p:extLst>
   </p:cSld>
@@ -413,7 +413,7 @@
           <a:p>
             <a:fld id="{9D1F0D2E-BCBB-7B4B-B3C4-B871C8CF8724}" type="datetimeFigureOut">
               <a:rPr lang="es-ES" smtClean="0"/>
-              <a:t>26/7/20</a:t>
+              <a:t>1/8/20</a:t>
             </a:fld>
             <a:endParaRPr lang="es-ES"/>
           </a:p>
@@ -464,7 +464,7 @@
     </p:spTree>
     <p:extLst>
       <p:ext uri="{BB962C8B-B14F-4D97-AF65-F5344CB8AC3E}">
-        <p14:creationId xmlns:p14="http://schemas.microsoft.com/office/powerpoint/2010/main" val="453787433"/>
+        <p14:creationId xmlns:p14="http://schemas.microsoft.com/office/powerpoint/2010/main" val="1429405879"/>
       </p:ext>
     </p:extLst>
   </p:cSld>
@@ -503,8 +503,8 @@
         </p:nvSpPr>
         <p:spPr>
           <a:xfrm>
-            <a:off x="7342322" y="182055"/>
-            <a:ext cx="2212315" cy="2897847"/>
+            <a:off x="4895260" y="364195"/>
+            <a:ext cx="1474991" cy="5797040"/>
           </a:xfrm>
         </p:spPr>
         <p:txBody>
@@ -531,8 +531,8 @@
         </p:nvSpPr>
         <p:spPr>
           <a:xfrm>
-            <a:off x="705376" y="182055"/>
-            <a:ext cx="6508696" cy="2897847"/>
+            <a:off x="470288" y="364195"/>
+            <a:ext cx="4339466" cy="5797040"/>
           </a:xfrm>
         </p:spPr>
         <p:txBody>
@@ -593,7 +593,7 @@
           <a:p>
             <a:fld id="{9D1F0D2E-BCBB-7B4B-B3C4-B871C8CF8724}" type="datetimeFigureOut">
               <a:rPr lang="es-ES" smtClean="0"/>
-              <a:t>26/7/20</a:t>
+              <a:t>1/8/20</a:t>
             </a:fld>
             <a:endParaRPr lang="es-ES"/>
           </a:p>
@@ -644,7 +644,7 @@
     </p:spTree>
     <p:extLst>
       <p:ext uri="{BB962C8B-B14F-4D97-AF65-F5344CB8AC3E}">
-        <p14:creationId xmlns:p14="http://schemas.microsoft.com/office/powerpoint/2010/main" val="2584609683"/>
+        <p14:creationId xmlns:p14="http://schemas.microsoft.com/office/powerpoint/2010/main" val="1063593845"/>
       </p:ext>
     </p:extLst>
   </p:cSld>
@@ -763,7 +763,7 @@
           <a:p>
             <a:fld id="{9D1F0D2E-BCBB-7B4B-B3C4-B871C8CF8724}" type="datetimeFigureOut">
               <a:rPr lang="es-ES" smtClean="0"/>
-              <a:t>26/7/20</a:t>
+              <a:t>1/8/20</a:t>
             </a:fld>
             <a:endParaRPr lang="es-ES"/>
           </a:p>
@@ -814,7 +814,7 @@
     </p:spTree>
     <p:extLst>
       <p:ext uri="{BB962C8B-B14F-4D97-AF65-F5344CB8AC3E}">
-        <p14:creationId xmlns:p14="http://schemas.microsoft.com/office/powerpoint/2010/main" val="4021187923"/>
+        <p14:creationId xmlns:p14="http://schemas.microsoft.com/office/powerpoint/2010/main" val="2275164355"/>
       </p:ext>
     </p:extLst>
   </p:cSld>
@@ -853,15 +853,15 @@
         </p:nvSpPr>
         <p:spPr>
           <a:xfrm>
-            <a:off x="700032" y="852495"/>
-            <a:ext cx="8849261" cy="1422406"/>
+            <a:off x="466725" y="1705386"/>
+            <a:ext cx="5899964" cy="2845473"/>
           </a:xfrm>
         </p:spPr>
         <p:txBody>
           <a:bodyPr anchor="b"/>
           <a:lstStyle>
             <a:lvl1pPr>
-              <a:defRPr sz="2992"/>
+              <a:defRPr sz="4489"/>
             </a:lvl1pPr>
           </a:lstStyle>
           <a:p>
@@ -885,14 +885,42 @@
         </p:nvSpPr>
         <p:spPr>
           <a:xfrm>
-            <a:off x="700032" y="2288357"/>
-            <a:ext cx="8849261" cy="748010"/>
+            <a:off x="466725" y="4577779"/>
+            <a:ext cx="5899964" cy="1496367"/>
           </a:xfrm>
         </p:spPr>
         <p:txBody>
           <a:bodyPr/>
           <a:lstStyle>
             <a:lvl1pPr marL="0" indent="0">
+              <a:buNone/>
+              <a:defRPr sz="1795">
+                <a:solidFill>
+                  <a:schemeClr val="tx1"/>
+                </a:solidFill>
+              </a:defRPr>
+            </a:lvl1pPr>
+            <a:lvl2pPr marL="342031" indent="0">
+              <a:buNone/>
+              <a:defRPr sz="1496">
+                <a:solidFill>
+                  <a:schemeClr val="tx1">
+                    <a:tint val="75000"/>
+                  </a:schemeClr>
+                </a:solidFill>
+              </a:defRPr>
+            </a:lvl2pPr>
+            <a:lvl3pPr marL="684063" indent="0">
+              <a:buNone/>
+              <a:defRPr sz="1347">
+                <a:solidFill>
+                  <a:schemeClr val="tx1">
+                    <a:tint val="75000"/>
+                  </a:schemeClr>
+                </a:solidFill>
+              </a:defRPr>
+            </a:lvl3pPr>
+            <a:lvl4pPr marL="1026094" indent="0">
               <a:buNone/>
               <a:defRPr sz="1197">
                 <a:solidFill>
@@ -901,40 +929,10 @@
                   </a:schemeClr>
                 </a:solidFill>
               </a:defRPr>
-            </a:lvl1pPr>
-            <a:lvl2pPr marL="227960" indent="0">
-              <a:buNone/>
-              <a:defRPr sz="997">
-                <a:solidFill>
-                  <a:schemeClr val="tx1">
-                    <a:tint val="75000"/>
-                  </a:schemeClr>
-                </a:solidFill>
-              </a:defRPr>
-            </a:lvl2pPr>
-            <a:lvl3pPr marL="455920" indent="0">
-              <a:buNone/>
-              <a:defRPr sz="897">
-                <a:solidFill>
-                  <a:schemeClr val="tx1">
-                    <a:tint val="75000"/>
-                  </a:schemeClr>
-                </a:solidFill>
-              </a:defRPr>
-            </a:lvl3pPr>
-            <a:lvl4pPr marL="683880" indent="0">
-              <a:buNone/>
-              <a:defRPr sz="798">
-                <a:solidFill>
-                  <a:schemeClr val="tx1">
-                    <a:tint val="75000"/>
-                  </a:schemeClr>
-                </a:solidFill>
-              </a:defRPr>
             </a:lvl4pPr>
-            <a:lvl5pPr marL="911840" indent="0">
-              <a:buNone/>
-              <a:defRPr sz="798">
+            <a:lvl5pPr marL="1368125" indent="0">
+              <a:buNone/>
+              <a:defRPr sz="1197">
                 <a:solidFill>
                   <a:schemeClr val="tx1">
                     <a:tint val="75000"/>
@@ -942,9 +940,9 @@
                 </a:solidFill>
               </a:defRPr>
             </a:lvl5pPr>
-            <a:lvl6pPr marL="1139800" indent="0">
-              <a:buNone/>
-              <a:defRPr sz="798">
+            <a:lvl6pPr marL="1710157" indent="0">
+              <a:buNone/>
+              <a:defRPr sz="1197">
                 <a:solidFill>
                   <a:schemeClr val="tx1">
                     <a:tint val="75000"/>
@@ -952,9 +950,9 @@
                 </a:solidFill>
               </a:defRPr>
             </a:lvl6pPr>
-            <a:lvl7pPr marL="1367760" indent="0">
-              <a:buNone/>
-              <a:defRPr sz="798">
+            <a:lvl7pPr marL="2052188" indent="0">
+              <a:buNone/>
+              <a:defRPr sz="1197">
                 <a:solidFill>
                   <a:schemeClr val="tx1">
                     <a:tint val="75000"/>
@@ -962,9 +960,9 @@
                 </a:solidFill>
               </a:defRPr>
             </a:lvl7pPr>
-            <a:lvl8pPr marL="1595719" indent="0">
-              <a:buNone/>
-              <a:defRPr sz="798">
+            <a:lvl8pPr marL="2394219" indent="0">
+              <a:buNone/>
+              <a:defRPr sz="1197">
                 <a:solidFill>
                   <a:schemeClr val="tx1">
                     <a:tint val="75000"/>
@@ -972,9 +970,9 @@
                 </a:solidFill>
               </a:defRPr>
             </a:lvl8pPr>
-            <a:lvl9pPr marL="1823679" indent="0">
-              <a:buNone/>
-              <a:defRPr sz="798">
+            <a:lvl9pPr marL="2736251" indent="0">
+              <a:buNone/>
+              <a:defRPr sz="1197">
                 <a:solidFill>
                   <a:schemeClr val="tx1">
                     <a:tint val="75000"/>
@@ -1009,7 +1007,7 @@
           <a:p>
             <a:fld id="{9D1F0D2E-BCBB-7B4B-B3C4-B871C8CF8724}" type="datetimeFigureOut">
               <a:rPr lang="es-ES" smtClean="0"/>
-              <a:t>26/7/20</a:t>
+              <a:t>1/8/20</a:t>
             </a:fld>
             <a:endParaRPr lang="es-ES"/>
           </a:p>
@@ -1060,7 +1058,7 @@
     </p:spTree>
     <p:extLst>
       <p:ext uri="{BB962C8B-B14F-4D97-AF65-F5344CB8AC3E}">
-        <p14:creationId xmlns:p14="http://schemas.microsoft.com/office/powerpoint/2010/main" val="2241267234"/>
+        <p14:creationId xmlns:p14="http://schemas.microsoft.com/office/powerpoint/2010/main" val="105932869"/>
       </p:ext>
     </p:extLst>
   </p:cSld>
@@ -1122,8 +1120,8 @@
         </p:nvSpPr>
         <p:spPr>
           <a:xfrm>
-            <a:off x="705376" y="910277"/>
-            <a:ext cx="4360506" cy="2169625"/>
+            <a:off x="470287" y="1820976"/>
+            <a:ext cx="2907229" cy="4340259"/>
           </a:xfrm>
         </p:spPr>
         <p:txBody>
@@ -1179,8 +1177,8 @@
         </p:nvSpPr>
         <p:spPr>
           <a:xfrm>
-            <a:off x="5194131" y="910277"/>
-            <a:ext cx="4360506" cy="2169625"/>
+            <a:off x="3463022" y="1820976"/>
+            <a:ext cx="2907229" cy="4340259"/>
           </a:xfrm>
         </p:spPr>
         <p:txBody>
@@ -1241,7 +1239,7 @@
           <a:p>
             <a:fld id="{9D1F0D2E-BCBB-7B4B-B3C4-B871C8CF8724}" type="datetimeFigureOut">
               <a:rPr lang="es-ES" smtClean="0"/>
-              <a:t>26/7/20</a:t>
+              <a:t>1/8/20</a:t>
             </a:fld>
             <a:endParaRPr lang="es-ES"/>
           </a:p>
@@ -1292,7 +1290,7 @@
     </p:spTree>
     <p:extLst>
       <p:ext uri="{BB962C8B-B14F-4D97-AF65-F5344CB8AC3E}">
-        <p14:creationId xmlns:p14="http://schemas.microsoft.com/office/powerpoint/2010/main" val="4113399718"/>
+        <p14:creationId xmlns:p14="http://schemas.microsoft.com/office/powerpoint/2010/main" val="2447609424"/>
       </p:ext>
     </p:extLst>
   </p:cSld>
@@ -1331,8 +1329,8 @@
         </p:nvSpPr>
         <p:spPr>
           <a:xfrm>
-            <a:off x="706712" y="182056"/>
-            <a:ext cx="8849261" cy="660940"/>
+            <a:off x="471178" y="364197"/>
+            <a:ext cx="5899964" cy="1322188"/>
           </a:xfrm>
         </p:spPr>
         <p:txBody>
@@ -1359,8 +1357,8 @@
         </p:nvSpPr>
         <p:spPr>
           <a:xfrm>
-            <a:off x="706713" y="838246"/>
-            <a:ext cx="4340466" cy="410812"/>
+            <a:off x="471179" y="1676882"/>
+            <a:ext cx="2893868" cy="821814"/>
           </a:xfrm>
         </p:spPr>
         <p:txBody>
@@ -1368,39 +1366,39 @@
           <a:lstStyle>
             <a:lvl1pPr marL="0" indent="0">
               <a:buNone/>
+              <a:defRPr sz="1795" b="1"/>
+            </a:lvl1pPr>
+            <a:lvl2pPr marL="342031" indent="0">
+              <a:buNone/>
+              <a:defRPr sz="1496" b="1"/>
+            </a:lvl2pPr>
+            <a:lvl3pPr marL="684063" indent="0">
+              <a:buNone/>
+              <a:defRPr sz="1347" b="1"/>
+            </a:lvl3pPr>
+            <a:lvl4pPr marL="1026094" indent="0">
+              <a:buNone/>
               <a:defRPr sz="1197" b="1"/>
-            </a:lvl1pPr>
-            <a:lvl2pPr marL="227960" indent="0">
-              <a:buNone/>
-              <a:defRPr sz="997" b="1"/>
-            </a:lvl2pPr>
-            <a:lvl3pPr marL="455920" indent="0">
-              <a:buNone/>
-              <a:defRPr sz="897" b="1"/>
-            </a:lvl3pPr>
-            <a:lvl4pPr marL="683880" indent="0">
-              <a:buNone/>
-              <a:defRPr sz="798" b="1"/>
             </a:lvl4pPr>
-            <a:lvl5pPr marL="911840" indent="0">
-              <a:buNone/>
-              <a:defRPr sz="798" b="1"/>
+            <a:lvl5pPr marL="1368125" indent="0">
+              <a:buNone/>
+              <a:defRPr sz="1197" b="1"/>
             </a:lvl5pPr>
-            <a:lvl6pPr marL="1139800" indent="0">
-              <a:buNone/>
-              <a:defRPr sz="798" b="1"/>
+            <a:lvl6pPr marL="1710157" indent="0">
+              <a:buNone/>
+              <a:defRPr sz="1197" b="1"/>
             </a:lvl6pPr>
-            <a:lvl7pPr marL="1367760" indent="0">
-              <a:buNone/>
-              <a:defRPr sz="798" b="1"/>
+            <a:lvl7pPr marL="2052188" indent="0">
+              <a:buNone/>
+              <a:defRPr sz="1197" b="1"/>
             </a:lvl7pPr>
-            <a:lvl8pPr marL="1595719" indent="0">
-              <a:buNone/>
-              <a:defRPr sz="798" b="1"/>
+            <a:lvl8pPr marL="2394219" indent="0">
+              <a:buNone/>
+              <a:defRPr sz="1197" b="1"/>
             </a:lvl8pPr>
-            <a:lvl9pPr marL="1823679" indent="0">
-              <a:buNone/>
-              <a:defRPr sz="798" b="1"/>
+            <a:lvl9pPr marL="2736251" indent="0">
+              <a:buNone/>
+              <a:defRPr sz="1197" b="1"/>
             </a:lvl9pPr>
           </a:lstStyle>
           <a:p>
@@ -1424,8 +1422,8 @@
         </p:nvSpPr>
         <p:spPr>
           <a:xfrm>
-            <a:off x="706713" y="1249058"/>
-            <a:ext cx="4340466" cy="1837177"/>
+            <a:off x="471179" y="2498697"/>
+            <a:ext cx="2893868" cy="3675206"/>
           </a:xfrm>
         </p:spPr>
         <p:txBody>
@@ -1481,8 +1479,8 @@
         </p:nvSpPr>
         <p:spPr>
           <a:xfrm>
-            <a:off x="5194132" y="838246"/>
-            <a:ext cx="4361842" cy="410812"/>
+            <a:off x="3463023" y="1676882"/>
+            <a:ext cx="2908120" cy="821814"/>
           </a:xfrm>
         </p:spPr>
         <p:txBody>
@@ -1490,39 +1488,39 @@
           <a:lstStyle>
             <a:lvl1pPr marL="0" indent="0">
               <a:buNone/>
+              <a:defRPr sz="1795" b="1"/>
+            </a:lvl1pPr>
+            <a:lvl2pPr marL="342031" indent="0">
+              <a:buNone/>
+              <a:defRPr sz="1496" b="1"/>
+            </a:lvl2pPr>
+            <a:lvl3pPr marL="684063" indent="0">
+              <a:buNone/>
+              <a:defRPr sz="1347" b="1"/>
+            </a:lvl3pPr>
+            <a:lvl4pPr marL="1026094" indent="0">
+              <a:buNone/>
               <a:defRPr sz="1197" b="1"/>
-            </a:lvl1pPr>
-            <a:lvl2pPr marL="227960" indent="0">
-              <a:buNone/>
-              <a:defRPr sz="997" b="1"/>
-            </a:lvl2pPr>
-            <a:lvl3pPr marL="455920" indent="0">
-              <a:buNone/>
-              <a:defRPr sz="897" b="1"/>
-            </a:lvl3pPr>
-            <a:lvl4pPr marL="683880" indent="0">
-              <a:buNone/>
-              <a:defRPr sz="798" b="1"/>
             </a:lvl4pPr>
-            <a:lvl5pPr marL="911840" indent="0">
-              <a:buNone/>
-              <a:defRPr sz="798" b="1"/>
+            <a:lvl5pPr marL="1368125" indent="0">
+              <a:buNone/>
+              <a:defRPr sz="1197" b="1"/>
             </a:lvl5pPr>
-            <a:lvl6pPr marL="1139800" indent="0">
-              <a:buNone/>
-              <a:defRPr sz="798" b="1"/>
+            <a:lvl6pPr marL="1710157" indent="0">
+              <a:buNone/>
+              <a:defRPr sz="1197" b="1"/>
             </a:lvl6pPr>
-            <a:lvl7pPr marL="1367760" indent="0">
-              <a:buNone/>
-              <a:defRPr sz="798" b="1"/>
+            <a:lvl7pPr marL="2052188" indent="0">
+              <a:buNone/>
+              <a:defRPr sz="1197" b="1"/>
             </a:lvl7pPr>
-            <a:lvl8pPr marL="1595719" indent="0">
-              <a:buNone/>
-              <a:defRPr sz="798" b="1"/>
+            <a:lvl8pPr marL="2394219" indent="0">
+              <a:buNone/>
+              <a:defRPr sz="1197" b="1"/>
             </a:lvl8pPr>
-            <a:lvl9pPr marL="1823679" indent="0">
-              <a:buNone/>
-              <a:defRPr sz="798" b="1"/>
+            <a:lvl9pPr marL="2736251" indent="0">
+              <a:buNone/>
+              <a:defRPr sz="1197" b="1"/>
             </a:lvl9pPr>
           </a:lstStyle>
           <a:p>
@@ -1546,8 +1544,8 @@
         </p:nvSpPr>
         <p:spPr>
           <a:xfrm>
-            <a:off x="5194132" y="1249058"/>
-            <a:ext cx="4361842" cy="1837177"/>
+            <a:off x="3463023" y="2498697"/>
+            <a:ext cx="2908120" cy="3675206"/>
           </a:xfrm>
         </p:spPr>
         <p:txBody>
@@ -1608,7 +1606,7 @@
           <a:p>
             <a:fld id="{9D1F0D2E-BCBB-7B4B-B3C4-B871C8CF8724}" type="datetimeFigureOut">
               <a:rPr lang="es-ES" smtClean="0"/>
-              <a:t>26/7/20</a:t>
+              <a:t>1/8/20</a:t>
             </a:fld>
             <a:endParaRPr lang="es-ES"/>
           </a:p>
@@ -1659,7 +1657,7 @@
     </p:spTree>
     <p:extLst>
       <p:ext uri="{BB962C8B-B14F-4D97-AF65-F5344CB8AC3E}">
-        <p14:creationId xmlns:p14="http://schemas.microsoft.com/office/powerpoint/2010/main" val="3892568816"/>
+        <p14:creationId xmlns:p14="http://schemas.microsoft.com/office/powerpoint/2010/main" val="1842442593"/>
       </p:ext>
     </p:extLst>
   </p:cSld>
@@ -1726,7 +1724,7 @@
           <a:p>
             <a:fld id="{9D1F0D2E-BCBB-7B4B-B3C4-B871C8CF8724}" type="datetimeFigureOut">
               <a:rPr lang="es-ES" smtClean="0"/>
-              <a:t>26/7/20</a:t>
+              <a:t>1/8/20</a:t>
             </a:fld>
             <a:endParaRPr lang="es-ES"/>
           </a:p>
@@ -1777,7 +1775,7 @@
     </p:spTree>
     <p:extLst>
       <p:ext uri="{BB962C8B-B14F-4D97-AF65-F5344CB8AC3E}">
-        <p14:creationId xmlns:p14="http://schemas.microsoft.com/office/powerpoint/2010/main" val="2000373193"/>
+        <p14:creationId xmlns:p14="http://schemas.microsoft.com/office/powerpoint/2010/main" val="1209770412"/>
       </p:ext>
     </p:extLst>
   </p:cSld>
@@ -1821,7 +1819,7 @@
           <a:p>
             <a:fld id="{9D1F0D2E-BCBB-7B4B-B3C4-B871C8CF8724}" type="datetimeFigureOut">
               <a:rPr lang="es-ES" smtClean="0"/>
-              <a:t>26/7/20</a:t>
+              <a:t>1/8/20</a:t>
             </a:fld>
             <a:endParaRPr lang="es-ES"/>
           </a:p>
@@ -1872,7 +1870,7 @@
     </p:spTree>
     <p:extLst>
       <p:ext uri="{BB962C8B-B14F-4D97-AF65-F5344CB8AC3E}">
-        <p14:creationId xmlns:p14="http://schemas.microsoft.com/office/powerpoint/2010/main" val="1677621416"/>
+        <p14:creationId xmlns:p14="http://schemas.microsoft.com/office/powerpoint/2010/main" val="3022220929"/>
       </p:ext>
     </p:extLst>
   </p:cSld>
@@ -1911,15 +1909,15 @@
         </p:nvSpPr>
         <p:spPr>
           <a:xfrm>
-            <a:off x="706713" y="227965"/>
-            <a:ext cx="3309121" cy="797878"/>
+            <a:off x="471178" y="456036"/>
+            <a:ext cx="2206252" cy="1596126"/>
           </a:xfrm>
         </p:spPr>
         <p:txBody>
           <a:bodyPr anchor="b"/>
           <a:lstStyle>
             <a:lvl1pPr>
-              <a:defRPr sz="1596"/>
+              <a:defRPr sz="2394"/>
             </a:lvl1pPr>
           </a:lstStyle>
           <a:p>
@@ -1943,39 +1941,39 @@
         </p:nvSpPr>
         <p:spPr>
           <a:xfrm>
-            <a:off x="4361842" y="492341"/>
-            <a:ext cx="5194132" cy="2430044"/>
+            <a:off x="2908120" y="984912"/>
+            <a:ext cx="3463022" cy="4861216"/>
           </a:xfrm>
         </p:spPr>
         <p:txBody>
           <a:bodyPr/>
           <a:lstStyle>
             <a:lvl1pPr>
-              <a:defRPr sz="1596"/>
+              <a:defRPr sz="2394"/>
             </a:lvl1pPr>
             <a:lvl2pPr>
-              <a:defRPr sz="1396"/>
+              <a:defRPr sz="2095"/>
             </a:lvl2pPr>
             <a:lvl3pPr>
-              <a:defRPr sz="1197"/>
+              <a:defRPr sz="1795"/>
             </a:lvl3pPr>
             <a:lvl4pPr>
-              <a:defRPr sz="997"/>
+              <a:defRPr sz="1496"/>
             </a:lvl4pPr>
             <a:lvl5pPr>
-              <a:defRPr sz="997"/>
+              <a:defRPr sz="1496"/>
             </a:lvl5pPr>
             <a:lvl6pPr>
-              <a:defRPr sz="997"/>
+              <a:defRPr sz="1496"/>
             </a:lvl6pPr>
             <a:lvl7pPr>
-              <a:defRPr sz="997"/>
+              <a:defRPr sz="1496"/>
             </a:lvl7pPr>
             <a:lvl8pPr>
-              <a:defRPr sz="997"/>
+              <a:defRPr sz="1496"/>
             </a:lvl8pPr>
             <a:lvl9pPr>
-              <a:defRPr sz="997"/>
+              <a:defRPr sz="1496"/>
             </a:lvl9pPr>
           </a:lstStyle>
           <a:p>
@@ -2028,8 +2026,8 @@
         </p:nvSpPr>
         <p:spPr>
           <a:xfrm>
-            <a:off x="706713" y="1025843"/>
-            <a:ext cx="3309121" cy="1900500"/>
+            <a:off x="471178" y="2052161"/>
+            <a:ext cx="2206252" cy="3801883"/>
           </a:xfrm>
         </p:spPr>
         <p:txBody>
@@ -2037,39 +2035,39 @@
           <a:lstStyle>
             <a:lvl1pPr marL="0" indent="0">
               <a:buNone/>
-              <a:defRPr sz="798"/>
+              <a:defRPr sz="1197"/>
             </a:lvl1pPr>
-            <a:lvl2pPr marL="227960" indent="0">
-              <a:buNone/>
-              <a:defRPr sz="698"/>
+            <a:lvl2pPr marL="342031" indent="0">
+              <a:buNone/>
+              <a:defRPr sz="1047"/>
             </a:lvl2pPr>
-            <a:lvl3pPr marL="455920" indent="0">
-              <a:buNone/>
-              <a:defRPr sz="598"/>
+            <a:lvl3pPr marL="684063" indent="0">
+              <a:buNone/>
+              <a:defRPr sz="898"/>
             </a:lvl3pPr>
-            <a:lvl4pPr marL="683880" indent="0">
-              <a:buNone/>
-              <a:defRPr sz="499"/>
+            <a:lvl4pPr marL="1026094" indent="0">
+              <a:buNone/>
+              <a:defRPr sz="748"/>
             </a:lvl4pPr>
-            <a:lvl5pPr marL="911840" indent="0">
-              <a:buNone/>
-              <a:defRPr sz="499"/>
+            <a:lvl5pPr marL="1368125" indent="0">
+              <a:buNone/>
+              <a:defRPr sz="748"/>
             </a:lvl5pPr>
-            <a:lvl6pPr marL="1139800" indent="0">
-              <a:buNone/>
-              <a:defRPr sz="499"/>
+            <a:lvl6pPr marL="1710157" indent="0">
+              <a:buNone/>
+              <a:defRPr sz="748"/>
             </a:lvl6pPr>
-            <a:lvl7pPr marL="1367760" indent="0">
-              <a:buNone/>
-              <a:defRPr sz="499"/>
+            <a:lvl7pPr marL="2052188" indent="0">
+              <a:buNone/>
+              <a:defRPr sz="748"/>
             </a:lvl7pPr>
-            <a:lvl8pPr marL="1595719" indent="0">
-              <a:buNone/>
-              <a:defRPr sz="499"/>
+            <a:lvl8pPr marL="2394219" indent="0">
+              <a:buNone/>
+              <a:defRPr sz="748"/>
             </a:lvl8pPr>
-            <a:lvl9pPr marL="1823679" indent="0">
-              <a:buNone/>
-              <a:defRPr sz="499"/>
+            <a:lvl9pPr marL="2736251" indent="0">
+              <a:buNone/>
+              <a:defRPr sz="748"/>
             </a:lvl9pPr>
           </a:lstStyle>
           <a:p>
@@ -2098,7 +2096,7 @@
           <a:p>
             <a:fld id="{9D1F0D2E-BCBB-7B4B-B3C4-B871C8CF8724}" type="datetimeFigureOut">
               <a:rPr lang="es-ES" smtClean="0"/>
-              <a:t>26/7/20</a:t>
+              <a:t>1/8/20</a:t>
             </a:fld>
             <a:endParaRPr lang="es-ES"/>
           </a:p>
@@ -2149,7 +2147,7 @@
     </p:spTree>
     <p:extLst>
       <p:ext uri="{BB962C8B-B14F-4D97-AF65-F5344CB8AC3E}">
-        <p14:creationId xmlns:p14="http://schemas.microsoft.com/office/powerpoint/2010/main" val="627559208"/>
+        <p14:creationId xmlns:p14="http://schemas.microsoft.com/office/powerpoint/2010/main" val="2415340171"/>
       </p:ext>
     </p:extLst>
   </p:cSld>
@@ -2188,15 +2186,15 @@
         </p:nvSpPr>
         <p:spPr>
           <a:xfrm>
-            <a:off x="706713" y="227965"/>
-            <a:ext cx="3309121" cy="797878"/>
+            <a:off x="471178" y="456036"/>
+            <a:ext cx="2206252" cy="1596126"/>
           </a:xfrm>
         </p:spPr>
         <p:txBody>
           <a:bodyPr anchor="b"/>
           <a:lstStyle>
             <a:lvl1pPr>
-              <a:defRPr sz="1596"/>
+              <a:defRPr sz="2394"/>
             </a:lvl1pPr>
           </a:lstStyle>
           <a:p>
@@ -2220,8 +2218,8 @@
         </p:nvSpPr>
         <p:spPr>
           <a:xfrm>
-            <a:off x="4361842" y="492341"/>
-            <a:ext cx="5194132" cy="2430044"/>
+            <a:off x="2908120" y="984912"/>
+            <a:ext cx="3463022" cy="4861216"/>
           </a:xfrm>
         </p:spPr>
         <p:txBody>
@@ -2229,39 +2227,39 @@
           <a:lstStyle>
             <a:lvl1pPr marL="0" indent="0">
               <a:buNone/>
-              <a:defRPr sz="1596"/>
+              <a:defRPr sz="2394"/>
             </a:lvl1pPr>
-            <a:lvl2pPr marL="227960" indent="0">
-              <a:buNone/>
-              <a:defRPr sz="1396"/>
+            <a:lvl2pPr marL="342031" indent="0">
+              <a:buNone/>
+              <a:defRPr sz="2095"/>
             </a:lvl2pPr>
-            <a:lvl3pPr marL="455920" indent="0">
-              <a:buNone/>
-              <a:defRPr sz="1197"/>
+            <a:lvl3pPr marL="684063" indent="0">
+              <a:buNone/>
+              <a:defRPr sz="1795"/>
             </a:lvl3pPr>
-            <a:lvl4pPr marL="683880" indent="0">
-              <a:buNone/>
-              <a:defRPr sz="997"/>
+            <a:lvl4pPr marL="1026094" indent="0">
+              <a:buNone/>
+              <a:defRPr sz="1496"/>
             </a:lvl4pPr>
-            <a:lvl5pPr marL="911840" indent="0">
-              <a:buNone/>
-              <a:defRPr sz="997"/>
+            <a:lvl5pPr marL="1368125" indent="0">
+              <a:buNone/>
+              <a:defRPr sz="1496"/>
             </a:lvl5pPr>
-            <a:lvl6pPr marL="1139800" indent="0">
-              <a:buNone/>
-              <a:defRPr sz="997"/>
+            <a:lvl6pPr marL="1710157" indent="0">
+              <a:buNone/>
+              <a:defRPr sz="1496"/>
             </a:lvl6pPr>
-            <a:lvl7pPr marL="1367760" indent="0">
-              <a:buNone/>
-              <a:defRPr sz="997"/>
+            <a:lvl7pPr marL="2052188" indent="0">
+              <a:buNone/>
+              <a:defRPr sz="1496"/>
             </a:lvl7pPr>
-            <a:lvl8pPr marL="1595719" indent="0">
-              <a:buNone/>
-              <a:defRPr sz="997"/>
+            <a:lvl8pPr marL="2394219" indent="0">
+              <a:buNone/>
+              <a:defRPr sz="1496"/>
             </a:lvl8pPr>
-            <a:lvl9pPr marL="1823679" indent="0">
-              <a:buNone/>
-              <a:defRPr sz="997"/>
+            <a:lvl9pPr marL="2736251" indent="0">
+              <a:buNone/>
+              <a:defRPr sz="1496"/>
             </a:lvl9pPr>
           </a:lstStyle>
           <a:p>
@@ -2285,8 +2283,8 @@
         </p:nvSpPr>
         <p:spPr>
           <a:xfrm>
-            <a:off x="706713" y="1025843"/>
-            <a:ext cx="3309121" cy="1900500"/>
+            <a:off x="471178" y="2052161"/>
+            <a:ext cx="2206252" cy="3801883"/>
           </a:xfrm>
         </p:spPr>
         <p:txBody>
@@ -2294,39 +2292,39 @@
           <a:lstStyle>
             <a:lvl1pPr marL="0" indent="0">
               <a:buNone/>
-              <a:defRPr sz="798"/>
+              <a:defRPr sz="1197"/>
             </a:lvl1pPr>
-            <a:lvl2pPr marL="227960" indent="0">
-              <a:buNone/>
-              <a:defRPr sz="698"/>
+            <a:lvl2pPr marL="342031" indent="0">
+              <a:buNone/>
+              <a:defRPr sz="1047"/>
             </a:lvl2pPr>
-            <a:lvl3pPr marL="455920" indent="0">
-              <a:buNone/>
-              <a:defRPr sz="598"/>
+            <a:lvl3pPr marL="684063" indent="0">
+              <a:buNone/>
+              <a:defRPr sz="898"/>
             </a:lvl3pPr>
-            <a:lvl4pPr marL="683880" indent="0">
-              <a:buNone/>
-              <a:defRPr sz="499"/>
+            <a:lvl4pPr marL="1026094" indent="0">
+              <a:buNone/>
+              <a:defRPr sz="748"/>
             </a:lvl4pPr>
-            <a:lvl5pPr marL="911840" indent="0">
-              <a:buNone/>
-              <a:defRPr sz="499"/>
+            <a:lvl5pPr marL="1368125" indent="0">
+              <a:buNone/>
+              <a:defRPr sz="748"/>
             </a:lvl5pPr>
-            <a:lvl6pPr marL="1139800" indent="0">
-              <a:buNone/>
-              <a:defRPr sz="499"/>
+            <a:lvl6pPr marL="1710157" indent="0">
+              <a:buNone/>
+              <a:defRPr sz="748"/>
             </a:lvl6pPr>
-            <a:lvl7pPr marL="1367760" indent="0">
-              <a:buNone/>
-              <a:defRPr sz="499"/>
+            <a:lvl7pPr marL="2052188" indent="0">
+              <a:buNone/>
+              <a:defRPr sz="748"/>
             </a:lvl7pPr>
-            <a:lvl8pPr marL="1595719" indent="0">
-              <a:buNone/>
-              <a:defRPr sz="499"/>
+            <a:lvl8pPr marL="2394219" indent="0">
+              <a:buNone/>
+              <a:defRPr sz="748"/>
             </a:lvl8pPr>
-            <a:lvl9pPr marL="1823679" indent="0">
-              <a:buNone/>
-              <a:defRPr sz="499"/>
+            <a:lvl9pPr marL="2736251" indent="0">
+              <a:buNone/>
+              <a:defRPr sz="748"/>
             </a:lvl9pPr>
           </a:lstStyle>
           <a:p>
@@ -2355,7 +2353,7 @@
           <a:p>
             <a:fld id="{9D1F0D2E-BCBB-7B4B-B3C4-B871C8CF8724}" type="datetimeFigureOut">
               <a:rPr lang="es-ES" smtClean="0"/>
-              <a:t>26/7/20</a:t>
+              <a:t>1/8/20</a:t>
             </a:fld>
             <a:endParaRPr lang="es-ES"/>
           </a:p>
@@ -2406,7 +2404,7 @@
     </p:spTree>
     <p:extLst>
       <p:ext uri="{BB962C8B-B14F-4D97-AF65-F5344CB8AC3E}">
-        <p14:creationId xmlns:p14="http://schemas.microsoft.com/office/powerpoint/2010/main" val="2050958727"/>
+        <p14:creationId xmlns:p14="http://schemas.microsoft.com/office/powerpoint/2010/main" val="2250562238"/>
       </p:ext>
     </p:extLst>
   </p:cSld>
@@ -2450,8 +2448,8 @@
         </p:nvSpPr>
         <p:spPr>
           <a:xfrm>
-            <a:off x="705376" y="182056"/>
-            <a:ext cx="8849261" cy="660940"/>
+            <a:off x="470287" y="364197"/>
+            <a:ext cx="5899964" cy="1322188"/>
           </a:xfrm>
           <a:prstGeom prst="rect">
             <a:avLst/>
@@ -2483,8 +2481,8 @@
         </p:nvSpPr>
         <p:spPr>
           <a:xfrm>
-            <a:off x="705376" y="910277"/>
-            <a:ext cx="8849261" cy="2169625"/>
+            <a:off x="470287" y="1820976"/>
+            <a:ext cx="5899964" cy="4340259"/>
           </a:xfrm>
           <a:prstGeom prst="rect">
             <a:avLst/>
@@ -2545,8 +2543,8 @@
         </p:nvSpPr>
         <p:spPr>
           <a:xfrm>
-            <a:off x="705376" y="3169347"/>
-            <a:ext cx="2308503" cy="182055"/>
+            <a:off x="470287" y="6340167"/>
+            <a:ext cx="1539121" cy="364195"/>
           </a:xfrm>
           <a:prstGeom prst="rect">
             <a:avLst/>
@@ -2556,7 +2554,7 @@
           <a:bodyPr vert="horz" lIns="91440" tIns="45720" rIns="91440" bIns="45720" rtlCol="0" anchor="ctr"/>
           <a:lstStyle>
             <a:lvl1pPr algn="l">
-              <a:defRPr sz="598">
+              <a:defRPr sz="898">
                 <a:solidFill>
                   <a:schemeClr val="tx1">
                     <a:tint val="75000"/>
@@ -2568,7 +2566,7 @@
           <a:p>
             <a:fld id="{9D1F0D2E-BCBB-7B4B-B3C4-B871C8CF8724}" type="datetimeFigureOut">
               <a:rPr lang="es-ES" smtClean="0"/>
-              <a:t>26/7/20</a:t>
+              <a:t>1/8/20</a:t>
             </a:fld>
             <a:endParaRPr lang="es-ES"/>
           </a:p>
@@ -2586,8 +2584,8 @@
         </p:nvSpPr>
         <p:spPr>
           <a:xfrm>
-            <a:off x="3398630" y="3169347"/>
-            <a:ext cx="3462754" cy="182055"/>
+            <a:off x="2265928" y="6340167"/>
+            <a:ext cx="2308682" cy="364195"/>
           </a:xfrm>
           <a:prstGeom prst="rect">
             <a:avLst/>
@@ -2597,7 +2595,7 @@
           <a:bodyPr vert="horz" lIns="91440" tIns="45720" rIns="91440" bIns="45720" rtlCol="0" anchor="ctr"/>
           <a:lstStyle>
             <a:lvl1pPr algn="ctr">
-              <a:defRPr sz="598">
+              <a:defRPr sz="898">
                 <a:solidFill>
                   <a:schemeClr val="tx1">
                     <a:tint val="75000"/>
@@ -2623,8 +2621,8 @@
         </p:nvSpPr>
         <p:spPr>
           <a:xfrm>
-            <a:off x="7246134" y="3169347"/>
-            <a:ext cx="2308503" cy="182055"/>
+            <a:off x="4831130" y="6340167"/>
+            <a:ext cx="1539121" cy="364195"/>
           </a:xfrm>
           <a:prstGeom prst="rect">
             <a:avLst/>
@@ -2634,7 +2632,7 @@
           <a:bodyPr vert="horz" lIns="91440" tIns="45720" rIns="91440" bIns="45720" rtlCol="0" anchor="ctr"/>
           <a:lstStyle>
             <a:lvl1pPr algn="r">
-              <a:defRPr sz="598">
+              <a:defRPr sz="898">
                 <a:solidFill>
                   <a:schemeClr val="tx1">
                     <a:tint val="75000"/>
@@ -2655,27 +2653,27 @@
     </p:spTree>
     <p:extLst>
       <p:ext uri="{BB962C8B-B14F-4D97-AF65-F5344CB8AC3E}">
-        <p14:creationId xmlns:p14="http://schemas.microsoft.com/office/powerpoint/2010/main" val="836317371"/>
+        <p14:creationId xmlns:p14="http://schemas.microsoft.com/office/powerpoint/2010/main" val="4231862376"/>
       </p:ext>
     </p:extLst>
   </p:cSld>
   <p:clrMap bg1="lt1" tx1="dk1" bg2="lt2" tx2="dk2" accent1="accent1" accent2="accent2" accent3="accent3" accent4="accent4" accent5="accent5" accent6="accent6" hlink="hlink" folHlink="folHlink"/>
   <p:sldLayoutIdLst>
-    <p:sldLayoutId id="2147483709" r:id="rId1"/>
-    <p:sldLayoutId id="2147483710" r:id="rId2"/>
-    <p:sldLayoutId id="2147483711" r:id="rId3"/>
-    <p:sldLayoutId id="2147483712" r:id="rId4"/>
-    <p:sldLayoutId id="2147483713" r:id="rId5"/>
-    <p:sldLayoutId id="2147483714" r:id="rId6"/>
-    <p:sldLayoutId id="2147483715" r:id="rId7"/>
-    <p:sldLayoutId id="2147483716" r:id="rId8"/>
-    <p:sldLayoutId id="2147483717" r:id="rId9"/>
-    <p:sldLayoutId id="2147483718" r:id="rId10"/>
-    <p:sldLayoutId id="2147483719" r:id="rId11"/>
+    <p:sldLayoutId id="2147483721" r:id="rId1"/>
+    <p:sldLayoutId id="2147483722" r:id="rId2"/>
+    <p:sldLayoutId id="2147483723" r:id="rId3"/>
+    <p:sldLayoutId id="2147483724" r:id="rId4"/>
+    <p:sldLayoutId id="2147483725" r:id="rId5"/>
+    <p:sldLayoutId id="2147483726" r:id="rId6"/>
+    <p:sldLayoutId id="2147483727" r:id="rId7"/>
+    <p:sldLayoutId id="2147483728" r:id="rId8"/>
+    <p:sldLayoutId id="2147483729" r:id="rId9"/>
+    <p:sldLayoutId id="2147483730" r:id="rId10"/>
+    <p:sldLayoutId id="2147483731" r:id="rId11"/>
   </p:sldLayoutIdLst>
   <p:txStyles>
     <p:titleStyle>
-      <a:lvl1pPr algn="l" defTabSz="455920" rtl="0" eaLnBrk="1" latinLnBrk="0" hangingPunct="1">
+      <a:lvl1pPr algn="l" defTabSz="684063" rtl="0" eaLnBrk="1" latinLnBrk="0" hangingPunct="1">
         <a:lnSpc>
           <a:spcPct val="90000"/>
         </a:lnSpc>
@@ -2683,7 +2681,7 @@
           <a:spcPct val="0"/>
         </a:spcBef>
         <a:buNone/>
-        <a:defRPr sz="2194" kern="1200">
+        <a:defRPr sz="3292" kern="1200">
           <a:solidFill>
             <a:schemeClr val="tx1"/>
           </a:solidFill>
@@ -2694,16 +2692,16 @@
       </a:lvl1pPr>
     </p:titleStyle>
     <p:bodyStyle>
-      <a:lvl1pPr marL="113980" indent="-113980" algn="l" defTabSz="455920" rtl="0" eaLnBrk="1" latinLnBrk="0" hangingPunct="1">
+      <a:lvl1pPr marL="171016" indent="-171016" algn="l" defTabSz="684063" rtl="0" eaLnBrk="1" latinLnBrk="0" hangingPunct="1">
         <a:lnSpc>
           <a:spcPct val="90000"/>
         </a:lnSpc>
         <a:spcBef>
-          <a:spcPts val="499"/>
+          <a:spcPts val="748"/>
         </a:spcBef>
         <a:buFont typeface="Arial" panose="020B0604020202020204" pitchFamily="34" charset="0"/>
         <a:buChar char="•"/>
-        <a:defRPr sz="1396" kern="1200">
+        <a:defRPr sz="2095" kern="1200">
           <a:solidFill>
             <a:schemeClr val="tx1"/>
           </a:solidFill>
@@ -2712,16 +2710,16 @@
           <a:cs typeface="+mn-cs"/>
         </a:defRPr>
       </a:lvl1pPr>
-      <a:lvl2pPr marL="341940" indent="-113980" algn="l" defTabSz="455920" rtl="0" eaLnBrk="1" latinLnBrk="0" hangingPunct="1">
+      <a:lvl2pPr marL="513047" indent="-171016" algn="l" defTabSz="684063" rtl="0" eaLnBrk="1" latinLnBrk="0" hangingPunct="1">
         <a:lnSpc>
           <a:spcPct val="90000"/>
         </a:lnSpc>
         <a:spcBef>
-          <a:spcPts val="249"/>
+          <a:spcPts val="374"/>
         </a:spcBef>
         <a:buFont typeface="Arial" panose="020B0604020202020204" pitchFamily="34" charset="0"/>
         <a:buChar char="•"/>
-        <a:defRPr sz="1197" kern="1200">
+        <a:defRPr sz="1795" kern="1200">
           <a:solidFill>
             <a:schemeClr val="tx1"/>
           </a:solidFill>
@@ -2730,16 +2728,16 @@
           <a:cs typeface="+mn-cs"/>
         </a:defRPr>
       </a:lvl2pPr>
-      <a:lvl3pPr marL="569900" indent="-113980" algn="l" defTabSz="455920" rtl="0" eaLnBrk="1" latinLnBrk="0" hangingPunct="1">
+      <a:lvl3pPr marL="855078" indent="-171016" algn="l" defTabSz="684063" rtl="0" eaLnBrk="1" latinLnBrk="0" hangingPunct="1">
         <a:lnSpc>
           <a:spcPct val="90000"/>
         </a:lnSpc>
         <a:spcBef>
-          <a:spcPts val="249"/>
+          <a:spcPts val="374"/>
         </a:spcBef>
         <a:buFont typeface="Arial" panose="020B0604020202020204" pitchFamily="34" charset="0"/>
         <a:buChar char="•"/>
-        <a:defRPr sz="997" kern="1200">
+        <a:defRPr sz="1496" kern="1200">
           <a:solidFill>
             <a:schemeClr val="tx1"/>
           </a:solidFill>
@@ -2748,16 +2746,16 @@
           <a:cs typeface="+mn-cs"/>
         </a:defRPr>
       </a:lvl3pPr>
-      <a:lvl4pPr marL="797860" indent="-113980" algn="l" defTabSz="455920" rtl="0" eaLnBrk="1" latinLnBrk="0" hangingPunct="1">
+      <a:lvl4pPr marL="1197110" indent="-171016" algn="l" defTabSz="684063" rtl="0" eaLnBrk="1" latinLnBrk="0" hangingPunct="1">
         <a:lnSpc>
           <a:spcPct val="90000"/>
         </a:lnSpc>
         <a:spcBef>
-          <a:spcPts val="249"/>
+          <a:spcPts val="374"/>
         </a:spcBef>
         <a:buFont typeface="Arial" panose="020B0604020202020204" pitchFamily="34" charset="0"/>
         <a:buChar char="•"/>
-        <a:defRPr sz="897" kern="1200">
+        <a:defRPr sz="1347" kern="1200">
           <a:solidFill>
             <a:schemeClr val="tx1"/>
           </a:solidFill>
@@ -2766,16 +2764,16 @@
           <a:cs typeface="+mn-cs"/>
         </a:defRPr>
       </a:lvl4pPr>
-      <a:lvl5pPr marL="1025820" indent="-113980" algn="l" defTabSz="455920" rtl="0" eaLnBrk="1" latinLnBrk="0" hangingPunct="1">
+      <a:lvl5pPr marL="1539141" indent="-171016" algn="l" defTabSz="684063" rtl="0" eaLnBrk="1" latinLnBrk="0" hangingPunct="1">
         <a:lnSpc>
           <a:spcPct val="90000"/>
         </a:lnSpc>
         <a:spcBef>
-          <a:spcPts val="249"/>
+          <a:spcPts val="374"/>
         </a:spcBef>
         <a:buFont typeface="Arial" panose="020B0604020202020204" pitchFamily="34" charset="0"/>
         <a:buChar char="•"/>
-        <a:defRPr sz="897" kern="1200">
+        <a:defRPr sz="1347" kern="1200">
           <a:solidFill>
             <a:schemeClr val="tx1"/>
           </a:solidFill>
@@ -2784,16 +2782,16 @@
           <a:cs typeface="+mn-cs"/>
         </a:defRPr>
       </a:lvl5pPr>
-      <a:lvl6pPr marL="1253780" indent="-113980" algn="l" defTabSz="455920" rtl="0" eaLnBrk="1" latinLnBrk="0" hangingPunct="1">
+      <a:lvl6pPr marL="1881172" indent="-171016" algn="l" defTabSz="684063" rtl="0" eaLnBrk="1" latinLnBrk="0" hangingPunct="1">
         <a:lnSpc>
           <a:spcPct val="90000"/>
         </a:lnSpc>
         <a:spcBef>
-          <a:spcPts val="249"/>
+          <a:spcPts val="374"/>
         </a:spcBef>
         <a:buFont typeface="Arial" panose="020B0604020202020204" pitchFamily="34" charset="0"/>
         <a:buChar char="•"/>
-        <a:defRPr sz="897" kern="1200">
+        <a:defRPr sz="1347" kern="1200">
           <a:solidFill>
             <a:schemeClr val="tx1"/>
           </a:solidFill>
@@ -2802,16 +2800,16 @@
           <a:cs typeface="+mn-cs"/>
         </a:defRPr>
       </a:lvl6pPr>
-      <a:lvl7pPr marL="1481739" indent="-113980" algn="l" defTabSz="455920" rtl="0" eaLnBrk="1" latinLnBrk="0" hangingPunct="1">
+      <a:lvl7pPr marL="2223204" indent="-171016" algn="l" defTabSz="684063" rtl="0" eaLnBrk="1" latinLnBrk="0" hangingPunct="1">
         <a:lnSpc>
           <a:spcPct val="90000"/>
         </a:lnSpc>
         <a:spcBef>
-          <a:spcPts val="249"/>
+          <a:spcPts val="374"/>
         </a:spcBef>
         <a:buFont typeface="Arial" panose="020B0604020202020204" pitchFamily="34" charset="0"/>
         <a:buChar char="•"/>
-        <a:defRPr sz="897" kern="1200">
+        <a:defRPr sz="1347" kern="1200">
           <a:solidFill>
             <a:schemeClr val="tx1"/>
           </a:solidFill>
@@ -2820,16 +2818,16 @@
           <a:cs typeface="+mn-cs"/>
         </a:defRPr>
       </a:lvl7pPr>
-      <a:lvl8pPr marL="1709699" indent="-113980" algn="l" defTabSz="455920" rtl="0" eaLnBrk="1" latinLnBrk="0" hangingPunct="1">
+      <a:lvl8pPr marL="2565235" indent="-171016" algn="l" defTabSz="684063" rtl="0" eaLnBrk="1" latinLnBrk="0" hangingPunct="1">
         <a:lnSpc>
           <a:spcPct val="90000"/>
         </a:lnSpc>
         <a:spcBef>
-          <a:spcPts val="249"/>
+          <a:spcPts val="374"/>
         </a:spcBef>
         <a:buFont typeface="Arial" panose="020B0604020202020204" pitchFamily="34" charset="0"/>
         <a:buChar char="•"/>
-        <a:defRPr sz="897" kern="1200">
+        <a:defRPr sz="1347" kern="1200">
           <a:solidFill>
             <a:schemeClr val="tx1"/>
           </a:solidFill>
@@ -2838,16 +2836,16 @@
           <a:cs typeface="+mn-cs"/>
         </a:defRPr>
       </a:lvl8pPr>
-      <a:lvl9pPr marL="1937659" indent="-113980" algn="l" defTabSz="455920" rtl="0" eaLnBrk="1" latinLnBrk="0" hangingPunct="1">
+      <a:lvl9pPr marL="2907266" indent="-171016" algn="l" defTabSz="684063" rtl="0" eaLnBrk="1" latinLnBrk="0" hangingPunct="1">
         <a:lnSpc>
           <a:spcPct val="90000"/>
         </a:lnSpc>
         <a:spcBef>
-          <a:spcPts val="249"/>
+          <a:spcPts val="374"/>
         </a:spcBef>
         <a:buFont typeface="Arial" panose="020B0604020202020204" pitchFamily="34" charset="0"/>
         <a:buChar char="•"/>
-        <a:defRPr sz="897" kern="1200">
+        <a:defRPr sz="1347" kern="1200">
           <a:solidFill>
             <a:schemeClr val="tx1"/>
           </a:solidFill>
@@ -2861,8 +2859,8 @@
       <a:defPPr>
         <a:defRPr lang="en-US"/>
       </a:defPPr>
-      <a:lvl1pPr marL="0" algn="l" defTabSz="455920" rtl="0" eaLnBrk="1" latinLnBrk="0" hangingPunct="1">
-        <a:defRPr sz="897" kern="1200">
+      <a:lvl1pPr marL="0" algn="l" defTabSz="684063" rtl="0" eaLnBrk="1" latinLnBrk="0" hangingPunct="1">
+        <a:defRPr sz="1347" kern="1200">
           <a:solidFill>
             <a:schemeClr val="tx1"/>
           </a:solidFill>
@@ -2871,8 +2869,8 @@
           <a:cs typeface="+mn-cs"/>
         </a:defRPr>
       </a:lvl1pPr>
-      <a:lvl2pPr marL="227960" algn="l" defTabSz="455920" rtl="0" eaLnBrk="1" latinLnBrk="0" hangingPunct="1">
-        <a:defRPr sz="897" kern="1200">
+      <a:lvl2pPr marL="342031" algn="l" defTabSz="684063" rtl="0" eaLnBrk="1" latinLnBrk="0" hangingPunct="1">
+        <a:defRPr sz="1347" kern="1200">
           <a:solidFill>
             <a:schemeClr val="tx1"/>
           </a:solidFill>
@@ -2881,8 +2879,8 @@
           <a:cs typeface="+mn-cs"/>
         </a:defRPr>
       </a:lvl2pPr>
-      <a:lvl3pPr marL="455920" algn="l" defTabSz="455920" rtl="0" eaLnBrk="1" latinLnBrk="0" hangingPunct="1">
-        <a:defRPr sz="897" kern="1200">
+      <a:lvl3pPr marL="684063" algn="l" defTabSz="684063" rtl="0" eaLnBrk="1" latinLnBrk="0" hangingPunct="1">
+        <a:defRPr sz="1347" kern="1200">
           <a:solidFill>
             <a:schemeClr val="tx1"/>
           </a:solidFill>
@@ -2891,8 +2889,8 @@
           <a:cs typeface="+mn-cs"/>
         </a:defRPr>
       </a:lvl3pPr>
-      <a:lvl4pPr marL="683880" algn="l" defTabSz="455920" rtl="0" eaLnBrk="1" latinLnBrk="0" hangingPunct="1">
-        <a:defRPr sz="897" kern="1200">
+      <a:lvl4pPr marL="1026094" algn="l" defTabSz="684063" rtl="0" eaLnBrk="1" latinLnBrk="0" hangingPunct="1">
+        <a:defRPr sz="1347" kern="1200">
           <a:solidFill>
             <a:schemeClr val="tx1"/>
           </a:solidFill>
@@ -2901,8 +2899,8 @@
           <a:cs typeface="+mn-cs"/>
         </a:defRPr>
       </a:lvl4pPr>
-      <a:lvl5pPr marL="911840" algn="l" defTabSz="455920" rtl="0" eaLnBrk="1" latinLnBrk="0" hangingPunct="1">
-        <a:defRPr sz="897" kern="1200">
+      <a:lvl5pPr marL="1368125" algn="l" defTabSz="684063" rtl="0" eaLnBrk="1" latinLnBrk="0" hangingPunct="1">
+        <a:defRPr sz="1347" kern="1200">
           <a:solidFill>
             <a:schemeClr val="tx1"/>
           </a:solidFill>
@@ -2911,8 +2909,8 @@
           <a:cs typeface="+mn-cs"/>
         </a:defRPr>
       </a:lvl5pPr>
-      <a:lvl6pPr marL="1139800" algn="l" defTabSz="455920" rtl="0" eaLnBrk="1" latinLnBrk="0" hangingPunct="1">
-        <a:defRPr sz="897" kern="1200">
+      <a:lvl6pPr marL="1710157" algn="l" defTabSz="684063" rtl="0" eaLnBrk="1" latinLnBrk="0" hangingPunct="1">
+        <a:defRPr sz="1347" kern="1200">
           <a:solidFill>
             <a:schemeClr val="tx1"/>
           </a:solidFill>
@@ -2921,8 +2919,8 @@
           <a:cs typeface="+mn-cs"/>
         </a:defRPr>
       </a:lvl6pPr>
-      <a:lvl7pPr marL="1367760" algn="l" defTabSz="455920" rtl="0" eaLnBrk="1" latinLnBrk="0" hangingPunct="1">
-        <a:defRPr sz="897" kern="1200">
+      <a:lvl7pPr marL="2052188" algn="l" defTabSz="684063" rtl="0" eaLnBrk="1" latinLnBrk="0" hangingPunct="1">
+        <a:defRPr sz="1347" kern="1200">
           <a:solidFill>
             <a:schemeClr val="tx1"/>
           </a:solidFill>
@@ -2931,8 +2929,8 @@
           <a:cs typeface="+mn-cs"/>
         </a:defRPr>
       </a:lvl7pPr>
-      <a:lvl8pPr marL="1595719" algn="l" defTabSz="455920" rtl="0" eaLnBrk="1" latinLnBrk="0" hangingPunct="1">
-        <a:defRPr sz="897" kern="1200">
+      <a:lvl8pPr marL="2394219" algn="l" defTabSz="684063" rtl="0" eaLnBrk="1" latinLnBrk="0" hangingPunct="1">
+        <a:defRPr sz="1347" kern="1200">
           <a:solidFill>
             <a:schemeClr val="tx1"/>
           </a:solidFill>
@@ -2941,8 +2939,8 @@
           <a:cs typeface="+mn-cs"/>
         </a:defRPr>
       </a:lvl8pPr>
-      <a:lvl9pPr marL="1823679" algn="l" defTabSz="455920" rtl="0" eaLnBrk="1" latinLnBrk="0" hangingPunct="1">
-        <a:defRPr sz="897" kern="1200">
+      <a:lvl9pPr marL="2736251" algn="l" defTabSz="684063" rtl="0" eaLnBrk="1" latinLnBrk="0" hangingPunct="1">
+        <a:defRPr sz="1347" kern="1200">
           <a:solidFill>
             <a:schemeClr val="tx1"/>
           </a:solidFill>
@@ -2995,8 +2993,8 @@
         </p:blipFill>
         <p:spPr>
           <a:xfrm>
-            <a:off x="0" y="-1"/>
-            <a:ext cx="3419475" cy="3419475"/>
+            <a:off x="0" y="2"/>
+            <a:ext cx="3420000" cy="3420000"/>
           </a:xfrm>
           <a:prstGeom prst="rect">
             <a:avLst/>
@@ -3025,8 +3023,8 @@
         </p:blipFill>
         <p:spPr>
           <a:xfrm>
-            <a:off x="3420269" y="0"/>
-            <a:ext cx="3419475" cy="3419475"/>
+            <a:off x="3420538" y="2"/>
+            <a:ext cx="3420000" cy="3420000"/>
           </a:xfrm>
           <a:prstGeom prst="rect">
             <a:avLst/>
@@ -3055,8 +3053,8 @@
         </p:blipFill>
         <p:spPr>
           <a:xfrm>
-            <a:off x="6839744" y="0"/>
-            <a:ext cx="3419475" cy="3419475"/>
+            <a:off x="1710538" y="3420002"/>
+            <a:ext cx="3420000" cy="3420000"/>
           </a:xfrm>
           <a:prstGeom prst="rect">
             <a:avLst/>

</xml_diff>